<commit_message>
Small changes to poster
</commit_message>
<xml_diff>
--- a/Presentations/Deckblatt/Poster.pptx
+++ b/Presentations/Deckblatt/Poster.pptx
@@ -11,7 +11,7 @@
     <p:sldId id="275" r:id="rId2"/>
   </p:sldIdLst>
   <p:sldSz cx="21383625" cy="30275213"/>
-  <p:notesSz cx="29819600" cy="42341800"/>
+  <p:notesSz cx="7099300" cy="10234613"/>
   <p:defaultTextStyle>
     <a:defPPr>
       <a:defRPr lang="en-US"/>
@@ -166,18 +166,18 @@
         </p:nvSpPr>
         <p:spPr>
           <a:xfrm>
-            <a:off x="0" y="0"/>
-            <a:ext cx="12922250" cy="2122488"/>
+            <a:off x="1" y="1"/>
+            <a:ext cx="3076464" cy="513035"/>
           </a:xfrm>
           <a:prstGeom prst="rect">
             <a:avLst/>
           </a:prstGeom>
         </p:spPr>
         <p:txBody>
-          <a:bodyPr vert="horz" lIns="91440" tIns="45720" rIns="91440" bIns="45720" rtlCol="0"/>
+          <a:bodyPr vert="horz" lIns="21955" tIns="10978" rIns="21955" bIns="10978" rtlCol="0"/>
           <a:lstStyle>
             <a:lvl1pPr algn="l">
-              <a:defRPr sz="1200"/>
+              <a:defRPr sz="300"/>
             </a:lvl1pPr>
           </a:lstStyle>
           <a:p>
@@ -197,18 +197,18 @@
         </p:nvSpPr>
         <p:spPr>
           <a:xfrm>
-            <a:off x="16891000" y="0"/>
-            <a:ext cx="12922250" cy="2122488"/>
+            <a:off x="4021325" y="1"/>
+            <a:ext cx="3076464" cy="513035"/>
           </a:xfrm>
           <a:prstGeom prst="rect">
             <a:avLst/>
           </a:prstGeom>
         </p:spPr>
         <p:txBody>
-          <a:bodyPr vert="horz" lIns="91440" tIns="45720" rIns="91440" bIns="45720" rtlCol="0"/>
+          <a:bodyPr vert="horz" lIns="21955" tIns="10978" rIns="21955" bIns="10978" rtlCol="0"/>
           <a:lstStyle>
             <a:lvl1pPr algn="r">
-              <a:defRPr sz="1200"/>
+              <a:defRPr sz="300"/>
             </a:lvl1pPr>
           </a:lstStyle>
           <a:p>
@@ -232,8 +232,8 @@
         </p:nvSpPr>
         <p:spPr>
           <a:xfrm>
-            <a:off x="9863138" y="5292725"/>
-            <a:ext cx="10093325" cy="14290675"/>
+            <a:off x="2330450" y="1279525"/>
+            <a:ext cx="2438400" cy="3454400"/>
           </a:xfrm>
           <a:prstGeom prst="rect">
             <a:avLst/>
@@ -246,7 +246,7 @@
           </a:ln>
         </p:spPr>
         <p:txBody>
-          <a:bodyPr vert="horz" lIns="91440" tIns="45720" rIns="91440" bIns="45720" rtlCol="0" anchor="ctr"/>
+          <a:bodyPr vert="horz" lIns="21955" tIns="10978" rIns="21955" bIns="10978" rtlCol="0" anchor="ctr"/>
           <a:lstStyle/>
           <a:p>
             <a:endParaRPr lang="de-DE"/>
@@ -265,15 +265,15 @@
         </p:nvSpPr>
         <p:spPr>
           <a:xfrm>
-            <a:off x="2981325" y="20377150"/>
-            <a:ext cx="23856950" cy="16671925"/>
+            <a:off x="709779" y="4925446"/>
+            <a:ext cx="5679742" cy="4029840"/>
           </a:xfrm>
           <a:prstGeom prst="rect">
             <a:avLst/>
           </a:prstGeom>
         </p:spPr>
         <p:txBody>
-          <a:bodyPr vert="horz" lIns="91440" tIns="45720" rIns="91440" bIns="45720" rtlCol="0"/>
+          <a:bodyPr vert="horz" lIns="21955" tIns="10978" rIns="21955" bIns="10978" rtlCol="0"/>
           <a:lstStyle/>
           <a:p>
             <a:pPr lvl="0"/>
@@ -325,18 +325,18 @@
         </p:nvSpPr>
         <p:spPr>
           <a:xfrm>
-            <a:off x="0" y="40219313"/>
-            <a:ext cx="12922250" cy="2122487"/>
+            <a:off x="1" y="9721579"/>
+            <a:ext cx="3076464" cy="513035"/>
           </a:xfrm>
           <a:prstGeom prst="rect">
             <a:avLst/>
           </a:prstGeom>
         </p:spPr>
         <p:txBody>
-          <a:bodyPr vert="horz" lIns="91440" tIns="45720" rIns="91440" bIns="45720" rtlCol="0" anchor="b"/>
+          <a:bodyPr vert="horz" lIns="21955" tIns="10978" rIns="21955" bIns="10978" rtlCol="0" anchor="b"/>
           <a:lstStyle>
             <a:lvl1pPr algn="l">
-              <a:defRPr sz="1200"/>
+              <a:defRPr sz="300"/>
             </a:lvl1pPr>
           </a:lstStyle>
           <a:p>
@@ -356,18 +356,18 @@
         </p:nvSpPr>
         <p:spPr>
           <a:xfrm>
-            <a:off x="16891000" y="40219313"/>
-            <a:ext cx="12922250" cy="2122487"/>
+            <a:off x="4021325" y="9721579"/>
+            <a:ext cx="3076464" cy="513035"/>
           </a:xfrm>
           <a:prstGeom prst="rect">
             <a:avLst/>
           </a:prstGeom>
         </p:spPr>
         <p:txBody>
-          <a:bodyPr vert="horz" lIns="91440" tIns="45720" rIns="91440" bIns="45720" rtlCol="0" anchor="b"/>
+          <a:bodyPr vert="horz" lIns="21955" tIns="10978" rIns="21955" bIns="10978" rtlCol="0" anchor="b"/>
           <a:lstStyle>
             <a:lvl1pPr algn="r">
-              <a:defRPr sz="1200"/>
+              <a:defRPr sz="300"/>
             </a:lvl1pPr>
           </a:lstStyle>
           <a:p>
@@ -4863,7 +4863,7 @@
         <p:spPr>
           <a:xfrm>
             <a:off x="9845609" y="6662994"/>
-            <a:ext cx="11224555" cy="4767835"/>
+            <a:ext cx="11224555" cy="9409641"/>
           </a:xfrm>
           <a:prstGeom prst="rect">
             <a:avLst/>
@@ -4921,7 +4921,7 @@
         <p:spPr>
           <a:xfrm>
             <a:off x="373576" y="6824892"/>
-            <a:ext cx="9590076" cy="3416320"/>
+            <a:ext cx="9227209" cy="3416320"/>
           </a:xfrm>
           <a:prstGeom prst="rect">
             <a:avLst/>
@@ -6140,7 +6140,7 @@
         </p:blipFill>
         <p:spPr>
           <a:xfrm>
-            <a:off x="10754458" y="11766639"/>
+            <a:off x="10769013" y="11677927"/>
             <a:ext cx="2361631" cy="3045115"/>
           </a:xfrm>
           <a:prstGeom prst="rect">
@@ -6170,8 +6170,8 @@
         </p:blipFill>
         <p:spPr>
           <a:xfrm>
-            <a:off x="12144839" y="11683843"/>
-            <a:ext cx="5953935" cy="3332378"/>
+            <a:off x="12144840" y="11683843"/>
+            <a:ext cx="5569726" cy="3117339"/>
           </a:xfrm>
           <a:prstGeom prst="rect">
             <a:avLst/>
@@ -6200,7 +6200,7 @@
         </p:blipFill>
         <p:spPr>
           <a:xfrm>
-            <a:off x="16926702" y="11677927"/>
+            <a:off x="16685976" y="11538753"/>
             <a:ext cx="3248179" cy="3248179"/>
           </a:xfrm>
           <a:prstGeom prst="rect">
@@ -6229,8 +6229,8 @@
         </p:blipFill>
         <p:spPr>
           <a:xfrm>
-            <a:off x="15451668" y="14636280"/>
-            <a:ext cx="5953935" cy="1636653"/>
+            <a:off x="15710049" y="14709956"/>
+            <a:ext cx="5369442" cy="1475984"/>
           </a:xfrm>
           <a:prstGeom prst="rect">
             <a:avLst/>
@@ -6258,8 +6258,8 @@
         </p:blipFill>
         <p:spPr>
           <a:xfrm>
-            <a:off x="9526466" y="14800178"/>
-            <a:ext cx="5831376" cy="1358156"/>
+            <a:off x="9754994" y="14820581"/>
+            <a:ext cx="5545966" cy="1291683"/>
           </a:xfrm>
           <a:prstGeom prst="rect">
             <a:avLst/>

</xml_diff>

<commit_message>
qrcode n stuff ://
</commit_message>
<xml_diff>
--- a/Presentations/Deckblatt/Poster.pptx
+++ b/Presentations/Deckblatt/Poster.pptx
@@ -214,7 +214,7 @@
           <a:p>
             <a:fld id="{F5F779A3-EDDA-431B-AF07-CD568712874D}" type="datetimeFigureOut">
               <a:rPr lang="de-DE" smtClean="0"/>
-              <a:t>13.02.2025</a:t>
+              <a:t>14.02.2025</a:t>
             </a:fld>
             <a:endParaRPr lang="de-DE"/>
           </a:p>
@@ -697,7 +697,7 @@
           <a:p>
             <a:fld id="{DCC59FF0-020B-4F2F-9C83-EF26E34AF9B2}" type="datetimeFigureOut">
               <a:rPr lang="de-DE" smtClean="0"/>
-              <a:t>13.02.2025</a:t>
+              <a:t>14.02.2025</a:t>
             </a:fld>
             <a:endParaRPr lang="de-DE"/>
           </a:p>
@@ -867,7 +867,7 @@
           <a:p>
             <a:fld id="{DCC59FF0-020B-4F2F-9C83-EF26E34AF9B2}" type="datetimeFigureOut">
               <a:rPr lang="de-DE" smtClean="0"/>
-              <a:t>13.02.2025</a:t>
+              <a:t>14.02.2025</a:t>
             </a:fld>
             <a:endParaRPr lang="de-DE"/>
           </a:p>
@@ -1047,7 +1047,7 @@
           <a:p>
             <a:fld id="{DCC59FF0-020B-4F2F-9C83-EF26E34AF9B2}" type="datetimeFigureOut">
               <a:rPr lang="de-DE" smtClean="0"/>
-              <a:t>13.02.2025</a:t>
+              <a:t>14.02.2025</a:t>
             </a:fld>
             <a:endParaRPr lang="de-DE"/>
           </a:p>
@@ -1217,7 +1217,7 @@
           <a:p>
             <a:fld id="{DCC59FF0-020B-4F2F-9C83-EF26E34AF9B2}" type="datetimeFigureOut">
               <a:rPr lang="de-DE" smtClean="0"/>
-              <a:t>13.02.2025</a:t>
+              <a:t>14.02.2025</a:t>
             </a:fld>
             <a:endParaRPr lang="de-DE"/>
           </a:p>
@@ -1461,7 +1461,7 @@
           <a:p>
             <a:fld id="{DCC59FF0-020B-4F2F-9C83-EF26E34AF9B2}" type="datetimeFigureOut">
               <a:rPr lang="de-DE" smtClean="0"/>
-              <a:t>13.02.2025</a:t>
+              <a:t>14.02.2025</a:t>
             </a:fld>
             <a:endParaRPr lang="de-DE"/>
           </a:p>
@@ -1693,7 +1693,7 @@
           <a:p>
             <a:fld id="{DCC59FF0-020B-4F2F-9C83-EF26E34AF9B2}" type="datetimeFigureOut">
               <a:rPr lang="de-DE" smtClean="0"/>
-              <a:t>13.02.2025</a:t>
+              <a:t>14.02.2025</a:t>
             </a:fld>
             <a:endParaRPr lang="de-DE"/>
           </a:p>
@@ -2060,7 +2060,7 @@
           <a:p>
             <a:fld id="{DCC59FF0-020B-4F2F-9C83-EF26E34AF9B2}" type="datetimeFigureOut">
               <a:rPr lang="de-DE" smtClean="0"/>
-              <a:t>13.02.2025</a:t>
+              <a:t>14.02.2025</a:t>
             </a:fld>
             <a:endParaRPr lang="de-DE"/>
           </a:p>
@@ -2178,7 +2178,7 @@
           <a:p>
             <a:fld id="{DCC59FF0-020B-4F2F-9C83-EF26E34AF9B2}" type="datetimeFigureOut">
               <a:rPr lang="de-DE" smtClean="0"/>
-              <a:t>13.02.2025</a:t>
+              <a:t>14.02.2025</a:t>
             </a:fld>
             <a:endParaRPr lang="de-DE"/>
           </a:p>
@@ -2273,7 +2273,7 @@
           <a:p>
             <a:fld id="{DCC59FF0-020B-4F2F-9C83-EF26E34AF9B2}" type="datetimeFigureOut">
               <a:rPr lang="de-DE" smtClean="0"/>
-              <a:t>13.02.2025</a:t>
+              <a:t>14.02.2025</a:t>
             </a:fld>
             <a:endParaRPr lang="de-DE"/>
           </a:p>
@@ -2550,7 +2550,7 @@
           <a:p>
             <a:fld id="{DCC59FF0-020B-4F2F-9C83-EF26E34AF9B2}" type="datetimeFigureOut">
               <a:rPr lang="de-DE" smtClean="0"/>
-              <a:t>13.02.2025</a:t>
+              <a:t>14.02.2025</a:t>
             </a:fld>
             <a:endParaRPr lang="de-DE"/>
           </a:p>
@@ -2807,7 +2807,7 @@
           <a:p>
             <a:fld id="{DCC59FF0-020B-4F2F-9C83-EF26E34AF9B2}" type="datetimeFigureOut">
               <a:rPr lang="de-DE" smtClean="0"/>
-              <a:t>13.02.2025</a:t>
+              <a:t>14.02.2025</a:t>
             </a:fld>
             <a:endParaRPr lang="de-DE"/>
           </a:p>
@@ -3020,7 +3020,7 @@
           <a:p>
             <a:fld id="{DCC59FF0-020B-4F2F-9C83-EF26E34AF9B2}" type="datetimeFigureOut">
               <a:rPr lang="de-DE" smtClean="0"/>
-              <a:t>13.02.2025</a:t>
+              <a:t>14.02.2025</a:t>
             </a:fld>
             <a:endParaRPr lang="de-DE"/>
           </a:p>
@@ -3439,8 +3439,8 @@
         </p:nvSpPr>
         <p:spPr>
           <a:xfrm>
-            <a:off x="57122" y="5240342"/>
-            <a:ext cx="21429235" cy="25034871"/>
+            <a:off x="-14860" y="5442005"/>
+            <a:ext cx="21398486" cy="24833208"/>
           </a:xfrm>
           <a:prstGeom prst="rect">
             <a:avLst/>
@@ -3743,8 +3743,8 @@
         </p:nvSpPr>
         <p:spPr>
           <a:xfrm>
-            <a:off x="57125" y="49369"/>
-            <a:ext cx="21360598" cy="2375803"/>
+            <a:off x="-14861" y="1"/>
+            <a:ext cx="21432584" cy="2425172"/>
           </a:xfrm>
           <a:prstGeom prst="rect">
             <a:avLst/>
@@ -3804,8 +3804,8 @@
         </p:nvSpPr>
         <p:spPr>
           <a:xfrm>
-            <a:off x="57125" y="1735927"/>
-            <a:ext cx="21360598" cy="3367912"/>
+            <a:off x="-14860" y="1899588"/>
+            <a:ext cx="21432580" cy="3542417"/>
           </a:xfrm>
           <a:prstGeom prst="rect">
             <a:avLst/>
@@ -3859,8 +3859,8 @@
         </p:nvSpPr>
         <p:spPr>
           <a:xfrm>
-            <a:off x="57124" y="1721844"/>
-            <a:ext cx="21360600" cy="266288"/>
+            <a:off x="-14863" y="1721844"/>
+            <a:ext cx="21432587" cy="346170"/>
           </a:xfrm>
           <a:prstGeom prst="rect">
             <a:avLst/>
@@ -3914,8 +3914,8 @@
         </p:nvSpPr>
         <p:spPr>
           <a:xfrm>
-            <a:off x="19219" y="2013175"/>
-            <a:ext cx="21360601" cy="1446550"/>
+            <a:off x="1102175" y="2013175"/>
+            <a:ext cx="14296174" cy="1446550"/>
           </a:xfrm>
           <a:prstGeom prst="rect">
             <a:avLst/>
@@ -3957,8 +3957,8 @@
         </p:nvSpPr>
         <p:spPr>
           <a:xfrm>
-            <a:off x="631166" y="4229132"/>
-            <a:ext cx="20136708" cy="1015663"/>
+            <a:off x="1102175" y="4229132"/>
+            <a:ext cx="13477050" cy="1015663"/>
           </a:xfrm>
           <a:prstGeom prst="rect">
             <a:avLst/>
@@ -4002,8 +4002,8 @@
         </p:nvSpPr>
         <p:spPr>
           <a:xfrm>
-            <a:off x="-14862" y="29380671"/>
-            <a:ext cx="21656020" cy="894542"/>
+            <a:off x="-14861" y="29380671"/>
+            <a:ext cx="21573201" cy="894542"/>
           </a:xfrm>
           <a:prstGeom prst="rect">
             <a:avLst/>
@@ -4164,7 +4164,7 @@
                 <a:latin typeface="Aptos" panose="020B0004020202020204" pitchFamily="34" charset="0"/>
                 <a:cs typeface="Times New Roman" panose="02020603050405020304" pitchFamily="18" charset="0"/>
               </a:rPr>
-              <a:t> Ergebnisse 🏆</a:t>
+              <a:t> Ergebnisse 🏆 (ausgewählte Beispiele)</a:t>
             </a:r>
           </a:p>
         </p:txBody>
@@ -4185,8 +4185,8 @@
         </p:nvSpPr>
         <p:spPr>
           <a:xfrm>
-            <a:off x="220406" y="26153344"/>
-            <a:ext cx="7476942" cy="824313"/>
+            <a:off x="220405" y="26035593"/>
+            <a:ext cx="21032227" cy="632254"/>
           </a:xfrm>
           <a:prstGeom prst="rect">
             <a:avLst/>
@@ -4578,8 +4578,8 @@
         </p:nvSpPr>
         <p:spPr>
           <a:xfrm>
-            <a:off x="38170" y="3478814"/>
-            <a:ext cx="21360601" cy="707886"/>
+            <a:off x="1102175" y="3478814"/>
+            <a:ext cx="14296174" cy="707886"/>
           </a:xfrm>
           <a:prstGeom prst="rect">
             <a:avLst/>
@@ -4736,8 +4736,8 @@
         </p:nvSpPr>
         <p:spPr>
           <a:xfrm>
-            <a:off x="9891219" y="6268845"/>
-            <a:ext cx="11224555" cy="9182170"/>
+            <a:off x="9891219" y="6268844"/>
+            <a:ext cx="11224555" cy="9197063"/>
           </a:xfrm>
           <a:prstGeom prst="rect">
             <a:avLst/>
@@ -4851,7 +4851,7 @@
         <p:spPr>
           <a:xfrm>
             <a:off x="9983546" y="6439282"/>
-            <a:ext cx="11092857" cy="4524315"/>
+            <a:ext cx="11092857" cy="8402300"/>
           </a:xfrm>
           <a:prstGeom prst="rect">
             <a:avLst/>
@@ -4897,7 +4897,80 @@
                 <a:latin typeface="Aptos" panose="020B0004020202020204" pitchFamily="34" charset="0"/>
                 <a:cs typeface="Times New Roman" panose="02020603050405020304" pitchFamily="18" charset="0"/>
               </a:rPr>
-              <a:t>“ von 2010 – 2011 und 2020 - 2021</a:t>
+              <a:t>“</a:t>
+            </a:r>
+          </a:p>
+          <a:p>
+            <a:r>
+              <a:rPr lang="de-DE" sz="3600" noProof="0" dirty="0">
+                <a:latin typeface="Aptos" panose="020B0004020202020204" pitchFamily="34" charset="0"/>
+                <a:cs typeface="Times New Roman" panose="02020603050405020304" pitchFamily="18" charset="0"/>
+              </a:rPr>
+              <a:t>📢 </a:t>
+            </a:r>
+            <a:r>
+              <a:rPr lang="de-DE" sz="3600" b="1" noProof="0" dirty="0">
+                <a:latin typeface="Aptos" panose="020B0004020202020204" pitchFamily="34" charset="0"/>
+                <a:cs typeface="Times New Roman" panose="02020603050405020304" pitchFamily="18" charset="0"/>
+              </a:rPr>
+              <a:t>Vergleich</a:t>
+            </a:r>
+            <a:r>
+              <a:rPr lang="de-DE" sz="3600" noProof="0" dirty="0">
+                <a:latin typeface="Aptos" panose="020B0004020202020204" pitchFamily="34" charset="0"/>
+                <a:cs typeface="Times New Roman" panose="02020603050405020304" pitchFamily="18" charset="0"/>
+              </a:rPr>
+              <a:t> zwischen einer amerikanischen und einer britischen Zeitung</a:t>
+            </a:r>
+          </a:p>
+          <a:p>
+            <a:r>
+              <a:rPr lang="de-DE" sz="3600" dirty="0">
+                <a:latin typeface="Aptos" panose="020B0004020202020204" pitchFamily="34" charset="0"/>
+                <a:cs typeface="Times New Roman" panose="02020603050405020304" pitchFamily="18" charset="0"/>
+              </a:rPr>
+              <a:t>📅Langzeitdatenanalyse </a:t>
+            </a:r>
+            <a:r>
+              <a:rPr lang="de-DE" sz="3600" noProof="0" dirty="0">
+                <a:latin typeface="Aptos" panose="020B0004020202020204" pitchFamily="34" charset="0"/>
+                <a:cs typeface="Times New Roman" panose="02020603050405020304" pitchFamily="18" charset="0"/>
+              </a:rPr>
+              <a:t>von 2010 – 2011 und 2020 – 2021 (interpoliert) </a:t>
+            </a:r>
+            <a:r>
+              <a:rPr lang="de-DE" sz="3600" dirty="0">
+                <a:latin typeface="Aptos" panose="020B0004020202020204" pitchFamily="34" charset="0"/>
+                <a:cs typeface="Times New Roman" panose="02020603050405020304" pitchFamily="18" charset="0"/>
+              </a:rPr>
+              <a:t>(120.000 Artikel)</a:t>
+            </a:r>
+            <a:endParaRPr lang="de-DE" sz="3600" noProof="0" dirty="0">
+              <a:latin typeface="Aptos" panose="020B0004020202020204" pitchFamily="34" charset="0"/>
+              <a:cs typeface="Times New Roman" panose="02020603050405020304" pitchFamily="18" charset="0"/>
+            </a:endParaRPr>
+          </a:p>
+          <a:p>
+            <a:r>
+              <a:rPr lang="de-DE" sz="3600" noProof="0" dirty="0">
+                <a:latin typeface="Aptos" panose="020B0004020202020204" pitchFamily="34" charset="0"/>
+                <a:cs typeface="Times New Roman" panose="02020603050405020304" pitchFamily="18" charset="0"/>
+              </a:rPr>
+              <a:t>🔎Identifikation von </a:t>
+            </a:r>
+            <a:r>
+              <a:rPr lang="de-DE" sz="3600" b="1" noProof="0" dirty="0">
+                <a:latin typeface="Aptos" panose="020B0004020202020204" pitchFamily="34" charset="0"/>
+                <a:cs typeface="Times New Roman" panose="02020603050405020304" pitchFamily="18" charset="0"/>
+              </a:rPr>
+              <a:t>langfristigen Trends</a:t>
+            </a:r>
+            <a:r>
+              <a:rPr lang="de-DE" sz="3600" noProof="0" dirty="0">
+                <a:latin typeface="Aptos" panose="020B0004020202020204" pitchFamily="34" charset="0"/>
+                <a:cs typeface="Times New Roman" panose="02020603050405020304" pitchFamily="18" charset="0"/>
+              </a:rPr>
+              <a:t> im Journalismus</a:t>
             </a:r>
           </a:p>
           <a:p>
@@ -4913,7 +4986,7 @@
                 <a:latin typeface="Aptos" panose="020B0004020202020204" pitchFamily="34" charset="0"/>
                 <a:cs typeface="Times New Roman" panose="02020603050405020304" pitchFamily="18" charset="0"/>
               </a:rPr>
-              <a:t>Objektivität</a:t>
+              <a:t>Subjektivität</a:t>
             </a:r>
             <a:r>
               <a:rPr lang="de-DE" sz="3600" noProof="0" dirty="0">
@@ -4939,48 +5012,68 @@
           </a:p>
           <a:p>
             <a:r>
+              <a:rPr lang="de-DE" sz="3600" dirty="0">
+                <a:latin typeface="Aptos" panose="020B0004020202020204" pitchFamily="34" charset="0"/>
+                <a:cs typeface="Times New Roman" panose="02020603050405020304" pitchFamily="18" charset="0"/>
+              </a:rPr>
+              <a:t>💻 Entwicklung einer </a:t>
+            </a:r>
+            <a:r>
+              <a:rPr lang="de-DE" sz="3600" b="1" dirty="0">
+                <a:latin typeface="Aptos" panose="020B0004020202020204" pitchFamily="34" charset="0"/>
+                <a:cs typeface="Times New Roman" panose="02020603050405020304" pitchFamily="18" charset="0"/>
+              </a:rPr>
+              <a:t>interaktiven</a:t>
+            </a:r>
+          </a:p>
+          <a:p>
+            <a:r>
+              <a:rPr lang="de-DE" sz="3600" dirty="0">
+                <a:latin typeface="Aptos" panose="020B0004020202020204" pitchFamily="34" charset="0"/>
+                <a:cs typeface="Times New Roman" panose="02020603050405020304" pitchFamily="18" charset="0"/>
+              </a:rPr>
+              <a:t> </a:t>
+            </a:r>
+            <a:r>
+              <a:rPr lang="de-DE" sz="3600" b="1" dirty="0">
+                <a:latin typeface="Aptos" panose="020B0004020202020204" pitchFamily="34" charset="0"/>
+                <a:cs typeface="Times New Roman" panose="02020603050405020304" pitchFamily="18" charset="0"/>
+              </a:rPr>
+              <a:t>Webseite </a:t>
+            </a:r>
+            <a:r>
+              <a:rPr lang="de-DE" sz="3600" dirty="0">
+                <a:latin typeface="Aptos" panose="020B0004020202020204" pitchFamily="34" charset="0"/>
+                <a:cs typeface="Times New Roman" panose="02020603050405020304" pitchFamily="18" charset="0"/>
+              </a:rPr>
+              <a:t>zur konkreten </a:t>
+            </a:r>
+          </a:p>
+          <a:p>
+            <a:r>
+              <a:rPr lang="de-DE" sz="3600" dirty="0">
+                <a:latin typeface="Aptos" panose="020B0004020202020204" pitchFamily="34" charset="0"/>
+                <a:cs typeface="Times New Roman" panose="02020603050405020304" pitchFamily="18" charset="0"/>
+              </a:rPr>
+              <a:t>Trendanalyse von Zeitungen</a:t>
+            </a:r>
+          </a:p>
+          <a:p>
+            <a:r>
               <a:rPr lang="de-DE" sz="3600" noProof="0" dirty="0">
                 <a:latin typeface="Aptos" panose="020B0004020202020204" pitchFamily="34" charset="0"/>
                 <a:cs typeface="Times New Roman" panose="02020603050405020304" pitchFamily="18" charset="0"/>
               </a:rPr>
-              <a:t>🔎Identifikation von </a:t>
-            </a:r>
-            <a:r>
-              <a:rPr lang="de-DE" sz="3600" b="1" noProof="0" dirty="0">
-                <a:latin typeface="Aptos" panose="020B0004020202020204" pitchFamily="34" charset="0"/>
-                <a:cs typeface="Times New Roman" panose="02020603050405020304" pitchFamily="18" charset="0"/>
-              </a:rPr>
-              <a:t>langfristigen Trends</a:t>
-            </a:r>
+              <a:t>(filtern nach Jahren, Rubriken,</a:t>
+            </a:r>
+          </a:p>
+          <a:p>
             <a:r>
               <a:rPr lang="de-DE" sz="3600" noProof="0" dirty="0">
                 <a:latin typeface="Aptos" panose="020B0004020202020204" pitchFamily="34" charset="0"/>
                 <a:cs typeface="Times New Roman" panose="02020603050405020304" pitchFamily="18" charset="0"/>
               </a:rPr>
-              <a:t> im Journalismus</a:t>
-            </a:r>
-          </a:p>
-          <a:p>
-            <a:r>
-              <a:rPr lang="de-DE" sz="3600" noProof="0" dirty="0">
-                <a:latin typeface="Aptos" panose="020B0004020202020204" pitchFamily="34" charset="0"/>
-                <a:cs typeface="Times New Roman" panose="02020603050405020304" pitchFamily="18" charset="0"/>
-              </a:rPr>
-              <a:t>📢 </a:t>
-            </a:r>
-            <a:r>
-              <a:rPr lang="de-DE" sz="3600" b="1" noProof="0" dirty="0">
-                <a:latin typeface="Aptos" panose="020B0004020202020204" pitchFamily="34" charset="0"/>
-                <a:cs typeface="Times New Roman" panose="02020603050405020304" pitchFamily="18" charset="0"/>
-              </a:rPr>
-              <a:t>Vergleich</a:t>
-            </a:r>
-            <a:r>
-              <a:rPr lang="de-DE" sz="3600" noProof="0" dirty="0">
-                <a:latin typeface="Aptos" panose="020B0004020202020204" pitchFamily="34" charset="0"/>
-                <a:cs typeface="Times New Roman" panose="02020603050405020304" pitchFamily="18" charset="0"/>
-              </a:rPr>
-              <a:t> zwischen einer amerikanischen und einer britischen Zeitung</a:t>
+              <a:t>Zeitungen📜)</a:t>
             </a:r>
           </a:p>
         </p:txBody>
@@ -5181,192 +5274,175 @@
           </a:p>
         </p:txBody>
       </p:sp>
-      <p:sp>
-        <p:nvSpPr>
-          <p:cNvPr id="11" name="Textfeld 10">
+      <p:grpSp>
+        <p:nvGrpSpPr>
+          <p:cNvPr id="17" name="Group 16">
             <a:extLst>
               <a:ext uri="{FF2B5EF4-FFF2-40B4-BE49-F238E27FC236}">
-                <a16:creationId xmlns:a16="http://schemas.microsoft.com/office/drawing/2014/main" id="{2D72864D-895D-3BB4-CCE5-7C56F93D2D41}"/>
+                <a16:creationId xmlns:a16="http://schemas.microsoft.com/office/drawing/2014/main" id="{B21C74DB-ADD6-0E0A-EC12-6A6C94F162A8}"/>
               </a:ext>
             </a:extLst>
           </p:cNvPr>
-          <p:cNvSpPr txBox="1"/>
+          <p:cNvGrpSpPr/>
           <p:nvPr/>
-        </p:nvSpPr>
-        <p:spPr>
-          <a:xfrm>
-            <a:off x="8949817" y="27681514"/>
-            <a:ext cx="9491036" cy="400110"/>
-          </a:xfrm>
-          <a:prstGeom prst="rect">
-            <a:avLst/>
-          </a:prstGeom>
-          <a:noFill/>
-        </p:spPr>
-        <p:txBody>
-          <a:bodyPr wrap="square" rtlCol="0">
-            <a:spAutoFit/>
-          </a:bodyPr>
-          <a:lstStyle/>
-          <a:p>
-            <a:r>
-              <a:rPr lang="de-DE" sz="2000" noProof="0" dirty="0">
-                <a:latin typeface="Aptos" panose="020B0004020202020204" pitchFamily="34" charset="0"/>
-                <a:cs typeface="Times New Roman" panose="02020603050405020304" pitchFamily="18" charset="0"/>
-              </a:rPr>
-              <a:t>Direkte Zitate</a:t>
-            </a:r>
-          </a:p>
-        </p:txBody>
-      </p:sp>
-      <p:pic>
-        <p:nvPicPr>
-          <p:cNvPr id="29" name="Picture 28">
-            <a:extLst>
-              <a:ext uri="{FF2B5EF4-FFF2-40B4-BE49-F238E27FC236}">
-                <a16:creationId xmlns:a16="http://schemas.microsoft.com/office/drawing/2014/main" id="{0DC952ED-F9B5-3131-9049-192ACA68F0CD}"/>
-              </a:ext>
-            </a:extLst>
-          </p:cNvPr>
-          <p:cNvPicPr>
-            <a:picLocks noChangeAspect="1"/>
-          </p:cNvPicPr>
-          <p:nvPr/>
-        </p:nvPicPr>
-        <p:blipFill>
-          <a:blip r:embed="rId6"/>
-          <a:stretch>
-            <a:fillRect/>
-          </a:stretch>
-        </p:blipFill>
-        <p:spPr>
-          <a:xfrm>
-            <a:off x="10922703" y="11178314"/>
-            <a:ext cx="2124027" cy="2738746"/>
-          </a:xfrm>
-          <a:prstGeom prst="rect">
-            <a:avLst/>
-          </a:prstGeom>
-        </p:spPr>
-      </p:pic>
-      <p:pic>
-        <p:nvPicPr>
-          <p:cNvPr id="32" name="Picture 31">
-            <a:extLst>
-              <a:ext uri="{FF2B5EF4-FFF2-40B4-BE49-F238E27FC236}">
-                <a16:creationId xmlns:a16="http://schemas.microsoft.com/office/drawing/2014/main" id="{F38D7A60-C5C2-ADF0-9478-8AEBF5787597}"/>
-              </a:ext>
-            </a:extLst>
-          </p:cNvPr>
-          <p:cNvPicPr>
-            <a:picLocks noChangeAspect="1"/>
-          </p:cNvPicPr>
-          <p:nvPr/>
-        </p:nvPicPr>
-        <p:blipFill>
-          <a:blip r:embed="rId7"/>
-          <a:stretch>
-            <a:fillRect/>
-          </a:stretch>
-        </p:blipFill>
-        <p:spPr>
-          <a:xfrm>
-            <a:off x="12130822" y="10945675"/>
-            <a:ext cx="5569726" cy="3117339"/>
-          </a:xfrm>
-          <a:prstGeom prst="rect">
-            <a:avLst/>
-          </a:prstGeom>
-        </p:spPr>
-      </p:pic>
-      <p:pic>
-        <p:nvPicPr>
-          <p:cNvPr id="36" name="Picture 35">
-            <a:extLst>
-              <a:ext uri="{FF2B5EF4-FFF2-40B4-BE49-F238E27FC236}">
-                <a16:creationId xmlns:a16="http://schemas.microsoft.com/office/drawing/2014/main" id="{E32111B5-9EA9-AA6B-11C0-A3C14198C24C}"/>
-              </a:ext>
-            </a:extLst>
-          </p:cNvPr>
-          <p:cNvPicPr>
-            <a:picLocks noChangeAspect="1"/>
-          </p:cNvPicPr>
-          <p:nvPr/>
-        </p:nvPicPr>
-        <p:blipFill>
-          <a:blip r:embed="rId8"/>
-          <a:stretch>
-            <a:fillRect/>
-          </a:stretch>
-        </p:blipFill>
-        <p:spPr>
-          <a:xfrm>
-            <a:off x="16646217" y="11045680"/>
-            <a:ext cx="2913785" cy="2913785"/>
-          </a:xfrm>
-          <a:prstGeom prst="rect">
-            <a:avLst/>
-          </a:prstGeom>
-        </p:spPr>
-      </p:pic>
-      <p:pic>
-        <p:nvPicPr>
-          <p:cNvPr id="40" name="Picture 39">
-            <a:extLst>
-              <a:ext uri="{FF2B5EF4-FFF2-40B4-BE49-F238E27FC236}">
-                <a16:creationId xmlns:a16="http://schemas.microsoft.com/office/drawing/2014/main" id="{C4641425-5500-1B16-C63E-C99A0B47222E}"/>
-              </a:ext>
-            </a:extLst>
-          </p:cNvPr>
-          <p:cNvPicPr>
-            <a:picLocks noChangeAspect="1"/>
-          </p:cNvPicPr>
-          <p:nvPr/>
-        </p:nvPicPr>
-        <p:blipFill>
-          <a:blip r:embed="rId9"/>
-          <a:srcRect t="36271" b="36271"/>
-          <a:stretch/>
-        </p:blipFill>
-        <p:spPr>
-          <a:xfrm>
-            <a:off x="15706961" y="13911024"/>
-            <a:ext cx="5369442" cy="1475984"/>
-          </a:xfrm>
-          <a:prstGeom prst="rect">
-            <a:avLst/>
-          </a:prstGeom>
-        </p:spPr>
-      </p:pic>
-      <p:pic>
-        <p:nvPicPr>
-          <p:cNvPr id="41" name="Picture 40">
-            <a:extLst>
-              <a:ext uri="{FF2B5EF4-FFF2-40B4-BE49-F238E27FC236}">
-                <a16:creationId xmlns:a16="http://schemas.microsoft.com/office/drawing/2014/main" id="{2635A352-E364-D02C-407A-9611C4E7A432}"/>
-              </a:ext>
-            </a:extLst>
-          </p:cNvPr>
-          <p:cNvPicPr>
-            <a:picLocks noChangeAspect="1"/>
-          </p:cNvPicPr>
-          <p:nvPr/>
-        </p:nvPicPr>
-        <p:blipFill>
-          <a:blip r:embed="rId10"/>
-          <a:srcRect l="18701" t="30507" b="35807"/>
-          <a:stretch/>
-        </p:blipFill>
-        <p:spPr>
-          <a:xfrm>
-            <a:off x="10171330" y="14082011"/>
-            <a:ext cx="5545966" cy="1291683"/>
-          </a:xfrm>
-          <a:prstGeom prst="rect">
-            <a:avLst/>
-          </a:prstGeom>
-        </p:spPr>
-      </p:pic>
+        </p:nvGrpSpPr>
+        <p:grpSpPr>
+          <a:xfrm>
+            <a:off x="14719841" y="2329753"/>
+            <a:ext cx="6151910" cy="2505502"/>
+            <a:chOff x="10171330" y="10945675"/>
+            <a:chExt cx="10905073" cy="4441333"/>
+          </a:xfrm>
+        </p:grpSpPr>
+        <p:pic>
+          <p:nvPicPr>
+            <p:cNvPr id="29" name="Picture 28">
+              <a:extLst>
+                <a:ext uri="{FF2B5EF4-FFF2-40B4-BE49-F238E27FC236}">
+                  <a16:creationId xmlns:a16="http://schemas.microsoft.com/office/drawing/2014/main" id="{0DC952ED-F9B5-3131-9049-192ACA68F0CD}"/>
+                </a:ext>
+              </a:extLst>
+            </p:cNvPr>
+            <p:cNvPicPr>
+              <a:picLocks noChangeAspect="1"/>
+            </p:cNvPicPr>
+            <p:nvPr/>
+          </p:nvPicPr>
+          <p:blipFill>
+            <a:blip r:embed="rId6"/>
+            <a:stretch>
+              <a:fillRect/>
+            </a:stretch>
+          </p:blipFill>
+          <p:spPr>
+            <a:xfrm>
+              <a:off x="10922703" y="11178314"/>
+              <a:ext cx="2124027" cy="2738746"/>
+            </a:xfrm>
+            <a:prstGeom prst="rect">
+              <a:avLst/>
+            </a:prstGeom>
+          </p:spPr>
+        </p:pic>
+        <p:pic>
+          <p:nvPicPr>
+            <p:cNvPr id="32" name="Picture 31">
+              <a:extLst>
+                <a:ext uri="{FF2B5EF4-FFF2-40B4-BE49-F238E27FC236}">
+                  <a16:creationId xmlns:a16="http://schemas.microsoft.com/office/drawing/2014/main" id="{F38D7A60-C5C2-ADF0-9478-8AEBF5787597}"/>
+                </a:ext>
+              </a:extLst>
+            </p:cNvPr>
+            <p:cNvPicPr>
+              <a:picLocks noChangeAspect="1"/>
+            </p:cNvPicPr>
+            <p:nvPr/>
+          </p:nvPicPr>
+          <p:blipFill>
+            <a:blip r:embed="rId7"/>
+            <a:stretch>
+              <a:fillRect/>
+            </a:stretch>
+          </p:blipFill>
+          <p:spPr>
+            <a:xfrm>
+              <a:off x="12130822" y="10945675"/>
+              <a:ext cx="5569726" cy="3117339"/>
+            </a:xfrm>
+            <a:prstGeom prst="rect">
+              <a:avLst/>
+            </a:prstGeom>
+          </p:spPr>
+        </p:pic>
+        <p:pic>
+          <p:nvPicPr>
+            <p:cNvPr id="36" name="Picture 35">
+              <a:extLst>
+                <a:ext uri="{FF2B5EF4-FFF2-40B4-BE49-F238E27FC236}">
+                  <a16:creationId xmlns:a16="http://schemas.microsoft.com/office/drawing/2014/main" id="{E32111B5-9EA9-AA6B-11C0-A3C14198C24C}"/>
+                </a:ext>
+              </a:extLst>
+            </p:cNvPr>
+            <p:cNvPicPr>
+              <a:picLocks noChangeAspect="1"/>
+            </p:cNvPicPr>
+            <p:nvPr/>
+          </p:nvPicPr>
+          <p:blipFill>
+            <a:blip r:embed="rId8"/>
+            <a:stretch>
+              <a:fillRect/>
+            </a:stretch>
+          </p:blipFill>
+          <p:spPr>
+            <a:xfrm>
+              <a:off x="16646217" y="11045680"/>
+              <a:ext cx="2913785" cy="2913785"/>
+            </a:xfrm>
+            <a:prstGeom prst="rect">
+              <a:avLst/>
+            </a:prstGeom>
+          </p:spPr>
+        </p:pic>
+        <p:pic>
+          <p:nvPicPr>
+            <p:cNvPr id="40" name="Picture 39">
+              <a:extLst>
+                <a:ext uri="{FF2B5EF4-FFF2-40B4-BE49-F238E27FC236}">
+                  <a16:creationId xmlns:a16="http://schemas.microsoft.com/office/drawing/2014/main" id="{C4641425-5500-1B16-C63E-C99A0B47222E}"/>
+                </a:ext>
+              </a:extLst>
+            </p:cNvPr>
+            <p:cNvPicPr>
+              <a:picLocks noChangeAspect="1"/>
+            </p:cNvPicPr>
+            <p:nvPr/>
+          </p:nvPicPr>
+          <p:blipFill>
+            <a:blip r:embed="rId9"/>
+            <a:srcRect t="36271" b="36271"/>
+            <a:stretch/>
+          </p:blipFill>
+          <p:spPr>
+            <a:xfrm>
+              <a:off x="15706961" y="13911024"/>
+              <a:ext cx="5369442" cy="1475984"/>
+            </a:xfrm>
+            <a:prstGeom prst="rect">
+              <a:avLst/>
+            </a:prstGeom>
+          </p:spPr>
+        </p:pic>
+        <p:pic>
+          <p:nvPicPr>
+            <p:cNvPr id="41" name="Picture 40">
+              <a:extLst>
+                <a:ext uri="{FF2B5EF4-FFF2-40B4-BE49-F238E27FC236}">
+                  <a16:creationId xmlns:a16="http://schemas.microsoft.com/office/drawing/2014/main" id="{2635A352-E364-D02C-407A-9611C4E7A432}"/>
+                </a:ext>
+              </a:extLst>
+            </p:cNvPr>
+            <p:cNvPicPr>
+              <a:picLocks noChangeAspect="1"/>
+            </p:cNvPicPr>
+            <p:nvPr/>
+          </p:nvPicPr>
+          <p:blipFill>
+            <a:blip r:embed="rId10"/>
+            <a:srcRect l="18701" t="30507" b="35807"/>
+            <a:stretch/>
+          </p:blipFill>
+          <p:spPr>
+            <a:xfrm>
+              <a:off x="10171330" y="14082011"/>
+              <a:ext cx="5545966" cy="1291683"/>
+            </a:xfrm>
+            <a:prstGeom prst="rect">
+              <a:avLst/>
+            </a:prstGeom>
+          </p:spPr>
+        </p:pic>
+      </p:grpSp>
       <p:sp>
         <p:nvSpPr>
           <p:cNvPr id="24" name="Rechteck 94">
@@ -5383,8 +5459,8 @@
         </p:nvSpPr>
         <p:spPr>
           <a:xfrm>
-            <a:off x="287181" y="26933068"/>
-            <a:ext cx="20824676" cy="1911962"/>
+            <a:off x="220406" y="26654351"/>
+            <a:ext cx="21032226" cy="2547148"/>
           </a:xfrm>
           <a:prstGeom prst="rect">
             <a:avLst/>
@@ -5427,95 +5503,6 @@
           </a:p>
         </p:txBody>
       </p:sp>
-      <p:sp>
-        <p:nvSpPr>
-          <p:cNvPr id="72" name="Textfeld 71">
-            <a:extLst>
-              <a:ext uri="{FF2B5EF4-FFF2-40B4-BE49-F238E27FC236}">
-                <a16:creationId xmlns:a16="http://schemas.microsoft.com/office/drawing/2014/main" id="{ED756739-7DBC-1FA6-C41A-668C96E238F1}"/>
-              </a:ext>
-            </a:extLst>
-          </p:cNvPr>
-          <p:cNvSpPr txBox="1"/>
-          <p:nvPr/>
-        </p:nvSpPr>
-        <p:spPr>
-          <a:xfrm>
-            <a:off x="2155285" y="26813595"/>
-            <a:ext cx="7229673" cy="707886"/>
-          </a:xfrm>
-          <a:prstGeom prst="rect">
-            <a:avLst/>
-          </a:prstGeom>
-          <a:noFill/>
-        </p:spPr>
-        <p:txBody>
-          <a:bodyPr wrap="square" rtlCol="0">
-            <a:spAutoFit/>
-          </a:bodyPr>
-          <a:lstStyle/>
-          <a:p>
-            <a:pPr algn="just"/>
-            <a:r>
-              <a:rPr lang="de-DE" sz="2000" noProof="0" dirty="0">
-                <a:latin typeface="Aptos" panose="020B0004020202020204" pitchFamily="34" charset="0"/>
-                <a:cs typeface="Times New Roman" panose="02020603050405020304" pitchFamily="18" charset="0"/>
-              </a:rPr>
-              <a:t>Text</a:t>
-            </a:r>
-          </a:p>
-          <a:p>
-            <a:pPr algn="just"/>
-            <a:endParaRPr lang="de-DE" sz="2000" noProof="0" dirty="0">
-              <a:latin typeface="Aptos" panose="020B0004020202020204" pitchFamily="34" charset="0"/>
-              <a:cs typeface="Times New Roman" panose="02020603050405020304" pitchFamily="18" charset="0"/>
-            </a:endParaRPr>
-          </a:p>
-        </p:txBody>
-      </p:sp>
-      <p:cxnSp>
-        <p:nvCxnSpPr>
-          <p:cNvPr id="6" name="Gerader Verbinder 5">
-            <a:extLst>
-              <a:ext uri="{FF2B5EF4-FFF2-40B4-BE49-F238E27FC236}">
-                <a16:creationId xmlns:a16="http://schemas.microsoft.com/office/drawing/2014/main" id="{61896088-AA9F-5439-87ED-E690F0A16B22}"/>
-              </a:ext>
-            </a:extLst>
-          </p:cNvPr>
-          <p:cNvCxnSpPr>
-            <a:cxnSpLocks/>
-          </p:cNvCxnSpPr>
-          <p:nvPr/>
-        </p:nvCxnSpPr>
-        <p:spPr>
-          <a:xfrm flipV="1">
-            <a:off x="3656815" y="26153344"/>
-            <a:ext cx="58222" cy="2736275"/>
-          </a:xfrm>
-          <a:prstGeom prst="line">
-            <a:avLst/>
-          </a:prstGeom>
-          <a:ln w="57150">
-            <a:solidFill>
-              <a:srgbClr val="ECA6AB"/>
-            </a:solidFill>
-          </a:ln>
-        </p:spPr>
-        <p:style>
-          <a:lnRef idx="1">
-            <a:schemeClr val="accent1"/>
-          </a:lnRef>
-          <a:fillRef idx="0">
-            <a:schemeClr val="accent1"/>
-          </a:fillRef>
-          <a:effectRef idx="0">
-            <a:schemeClr val="accent1"/>
-          </a:effectRef>
-          <a:fontRef idx="minor">
-            <a:schemeClr val="tx1"/>
-          </a:fontRef>
-        </p:style>
-      </p:cxnSp>
       <p:grpSp>
         <p:nvGrpSpPr>
           <p:cNvPr id="25" name="Group 24">
@@ -5530,7 +5517,7 @@
         </p:nvGrpSpPr>
         <p:grpSpPr>
           <a:xfrm>
-            <a:off x="22250380" y="18984065"/>
+            <a:off x="22770312" y="17431303"/>
             <a:ext cx="6361983" cy="7396521"/>
             <a:chOff x="14134485" y="20753556"/>
             <a:chExt cx="6361983" cy="7396521"/>
@@ -5774,7 +5761,7 @@
         </p:nvSpPr>
         <p:spPr>
           <a:xfrm>
-            <a:off x="10944609" y="20947035"/>
+            <a:off x="10944609" y="21009523"/>
             <a:ext cx="5150473" cy="1938992"/>
           </a:xfrm>
           <a:prstGeom prst="rect">
@@ -6281,8 +6268,8 @@
         </p:nvSpPr>
         <p:spPr>
           <a:xfrm>
-            <a:off x="254388" y="23437636"/>
-            <a:ext cx="5348720" cy="1200329"/>
+            <a:off x="318438" y="23513109"/>
+            <a:ext cx="4818103" cy="1938992"/>
           </a:xfrm>
           <a:prstGeom prst="rect">
             <a:avLst/>
@@ -6312,6 +6299,16 @@
             <a:r>
               <a:rPr lang="de-DE" sz="2400" dirty="0"/>
               <a:t>World-Artikel eher Objektiv</a:t>
+            </a:r>
+          </a:p>
+          <a:p>
+            <a:pPr marL="342900" indent="-342900">
+              <a:buFontTx/>
+              <a:buChar char="-"/>
+            </a:pPr>
+            <a:r>
+              <a:rPr lang="de-DE" sz="2400" dirty="0"/>
+              <a:t>Sehr ähnlicher Verlauf bei „The New York Times“</a:t>
             </a:r>
           </a:p>
         </p:txBody>
@@ -6448,8 +6445,8 @@
         </p:nvSpPr>
         <p:spPr>
           <a:xfrm>
-            <a:off x="16323240" y="20207898"/>
-            <a:ext cx="4933931" cy="353943"/>
+            <a:off x="16323240" y="20253512"/>
+            <a:ext cx="4933931" cy="584775"/>
           </a:xfrm>
           <a:prstGeom prst="rect">
             <a:avLst/>
@@ -6463,12 +6460,16 @@
           <a:lstStyle/>
           <a:p>
             <a:r>
-              <a:rPr lang="de-DE" sz="1700" b="1" dirty="0"/>
+              <a:rPr lang="de-DE" sz="1600" dirty="0"/>
+              <a:t>Abbildung 4: </a:t>
+            </a:r>
+            <a:r>
+              <a:rPr lang="de-DE" sz="1600" b="1" dirty="0"/>
               <a:t>Artikelanzahl</a:t>
             </a:r>
             <a:r>
-              <a:rPr lang="de-DE" sz="1700" dirty="0"/>
-              <a:t> der Rubrik Opinion von „The Guardian“</a:t>
+              <a:rPr lang="de-DE" sz="1600" dirty="0"/>
+              <a:t> der Rubrik „Opinion“ von „The Guardian“</a:t>
             </a:r>
           </a:p>
         </p:txBody>
@@ -6487,8 +6488,8 @@
         </p:nvSpPr>
         <p:spPr>
           <a:xfrm>
-            <a:off x="273139" y="20196480"/>
-            <a:ext cx="4933931" cy="615553"/>
+            <a:off x="195241" y="20108945"/>
+            <a:ext cx="4933931" cy="338554"/>
           </a:xfrm>
           <a:prstGeom prst="rect">
             <a:avLst/>
@@ -6502,12 +6503,16 @@
           <a:lstStyle/>
           <a:p>
             <a:r>
-              <a:rPr lang="de-DE" sz="1700" b="1" dirty="0"/>
+              <a:rPr lang="de-DE" sz="1600" dirty="0"/>
+              <a:t>Abbildung 1: </a:t>
+            </a:r>
+            <a:r>
+              <a:rPr lang="de-DE" sz="1600" b="1" dirty="0"/>
               <a:t>Subjektivität</a:t>
             </a:r>
             <a:r>
-              <a:rPr lang="de-DE" sz="1700" dirty="0"/>
-              <a:t> von „The Guardian“ ähnlich „The New York Times“</a:t>
+              <a:rPr lang="de-DE" sz="1600" dirty="0"/>
+              <a:t> von „The Guardian“ </a:t>
             </a:r>
           </a:p>
         </p:txBody>
@@ -6526,8 +6531,8 @@
         </p:nvSpPr>
         <p:spPr>
           <a:xfrm>
-            <a:off x="5654001" y="20141336"/>
-            <a:ext cx="4933931" cy="615553"/>
+            <a:off x="5678189" y="20129869"/>
+            <a:ext cx="4933931" cy="338554"/>
           </a:xfrm>
           <a:prstGeom prst="rect">
             <a:avLst/>
@@ -6541,18 +6546,16 @@
           <a:lstStyle/>
           <a:p>
             <a:r>
-              <a:rPr lang="de-DE" sz="1700" b="1" dirty="0"/>
+              <a:rPr lang="de-DE" sz="1600" dirty="0"/>
+              <a:t>Abbildung 2: </a:t>
+            </a:r>
+            <a:r>
+              <a:rPr lang="de-DE" sz="1600" b="1" dirty="0"/>
               <a:t>Polarisation</a:t>
             </a:r>
             <a:r>
-              <a:rPr lang="de-DE" sz="1700" dirty="0"/>
-              <a:t> von „The Guardian“ sehr ähnlich der </a:t>
-            </a:r>
-          </a:p>
-          <a:p>
-            <a:r>
-              <a:rPr lang="de-DE" sz="1700" dirty="0"/>
-              <a:t>„New York Times“</a:t>
+              <a:rPr lang="de-DE" sz="1600" dirty="0"/>
+              <a:t> von „The New York Times“ </a:t>
             </a:r>
           </a:p>
         </p:txBody>
@@ -6572,7 +6575,7 @@
         <p:spPr>
           <a:xfrm>
             <a:off x="11030675" y="20185782"/>
-            <a:ext cx="4933931" cy="615553"/>
+            <a:ext cx="4933931" cy="584775"/>
           </a:xfrm>
           <a:prstGeom prst="rect">
             <a:avLst/>
@@ -6586,11 +6589,15 @@
           <a:lstStyle/>
           <a:p>
             <a:r>
-              <a:rPr lang="de-DE" sz="1700" b="1" dirty="0"/>
+              <a:rPr lang="de-DE" sz="1600" dirty="0"/>
+              <a:t>Abbildung 3: </a:t>
+            </a:r>
+            <a:r>
+              <a:rPr lang="de-DE" sz="1600" b="1" dirty="0"/>
               <a:t>Wörteranzahl</a:t>
             </a:r>
             <a:r>
-              <a:rPr lang="de-DE" sz="1700" dirty="0"/>
+              <a:rPr lang="de-DE" sz="1600" dirty="0"/>
               <a:t> der Zeitung „The Guardian“, alle Rubriken vereint</a:t>
             </a:r>
           </a:p>
@@ -6672,7 +6679,7 @@
         </p:blipFill>
         <p:spPr bwMode="auto">
           <a:xfrm>
-            <a:off x="12951411" y="22944876"/>
+            <a:off x="12951411" y="23053908"/>
             <a:ext cx="568434" cy="699288"/>
           </a:xfrm>
           <a:prstGeom prst="rect">
@@ -6720,6 +6727,89 @@
         <p:spPr bwMode="auto">
           <a:xfrm>
             <a:off x="18097532" y="22969250"/>
+            <a:ext cx="568434" cy="699288"/>
+          </a:xfrm>
+          <a:prstGeom prst="rect">
+            <a:avLst/>
+          </a:prstGeom>
+          <a:noFill/>
+          <a:extLst>
+            <a:ext uri="{909E8E84-426E-40DD-AFC4-6F175D3DCCD1}">
+              <a14:hiddenFill xmlns:a14="http://schemas.microsoft.com/office/drawing/2010/main">
+                <a:solidFill>
+                  <a:srgbClr val="FFFFFF"/>
+                </a:solidFill>
+              </a14:hiddenFill>
+            </a:ext>
+          </a:extLst>
+        </p:spPr>
+      </p:pic>
+      <p:pic>
+        <p:nvPicPr>
+          <p:cNvPr id="4" name="Picture 3">
+            <a:extLst>
+              <a:ext uri="{FF2B5EF4-FFF2-40B4-BE49-F238E27FC236}">
+                <a16:creationId xmlns:a16="http://schemas.microsoft.com/office/drawing/2014/main" id="{AFCBE44B-4650-0E63-E329-4ACCC0AC23F5}"/>
+              </a:ext>
+            </a:extLst>
+          </p:cNvPr>
+          <p:cNvPicPr>
+            <a:picLocks noChangeAspect="1"/>
+          </p:cNvPicPr>
+          <p:nvPr/>
+        </p:nvPicPr>
+        <p:blipFill>
+          <a:blip r:embed="rId16">
+            <a:extLst>
+              <a:ext uri="{28A0092B-C50C-407E-A947-70E740481C1C}">
+                <a14:useLocalDpi xmlns:a14="http://schemas.microsoft.com/office/drawing/2010/main" val="0"/>
+              </a:ext>
+            </a:extLst>
+          </a:blip>
+          <a:stretch>
+            <a:fillRect/>
+          </a:stretch>
+        </p:blipFill>
+        <p:spPr>
+          <a:xfrm>
+            <a:off x="17068800" y="11428534"/>
+            <a:ext cx="4024650" cy="4024650"/>
+          </a:xfrm>
+          <a:prstGeom prst="rect">
+            <a:avLst/>
+          </a:prstGeom>
+        </p:spPr>
+      </p:pic>
+      <p:pic>
+        <p:nvPicPr>
+          <p:cNvPr id="18" name="Picture 2" descr="5.000+ kostenlose Pfeil und Richtung-Bilder - Pixabay">
+            <a:extLst>
+              <a:ext uri="{FF2B5EF4-FFF2-40B4-BE49-F238E27FC236}">
+                <a16:creationId xmlns:a16="http://schemas.microsoft.com/office/drawing/2014/main" id="{ED71E55A-5746-7580-6EA2-AE340732C584}"/>
+              </a:ext>
+            </a:extLst>
+          </p:cNvPr>
+          <p:cNvPicPr>
+            <a:picLocks noChangeAspect="1" noChangeArrowheads="1"/>
+          </p:cNvPicPr>
+          <p:nvPr/>
+        </p:nvPicPr>
+        <p:blipFill>
+          <a:blip r:embed="rId15" cstate="print">
+            <a:extLst>
+              <a:ext uri="{28A0092B-C50C-407E-A947-70E740481C1C}">
+                <a14:useLocalDpi xmlns:a14="http://schemas.microsoft.com/office/drawing/2010/main" val="0"/>
+              </a:ext>
+            </a:extLst>
+          </a:blip>
+          <a:srcRect/>
+          <a:stretch>
+            <a:fillRect/>
+          </a:stretch>
+        </p:blipFill>
+        <p:spPr bwMode="auto">
+          <a:xfrm rot="16200000">
+            <a:off x="16214947" y="12659780"/>
             <a:ext cx="568434" cy="699288"/>
           </a:xfrm>
           <a:prstGeom prst="rect">

</xml_diff>